<commit_message>
ajout ppt pour les figures
</commit_message>
<xml_diff>
--- a/L1_CM_files/figures.pptx
+++ b/L1_CM_files/figures.pptx
@@ -3331,7 +3331,7 @@
           <a:p>
             <a:fld id="{52212DD0-AC62-4744-9C7F-4A9162E5F150}" type="datetimeFigureOut">
               <a:rPr lang="fr-FR" smtClean="0"/>
-              <a:t>15/09/2025</a:t>
+              <a:t>17/10/2025</a:t>
             </a:fld>
             <a:endParaRPr lang="fr-FR"/>
           </a:p>
@@ -3529,7 +3529,7 @@
           <a:p>
             <a:fld id="{52212DD0-AC62-4744-9C7F-4A9162E5F150}" type="datetimeFigureOut">
               <a:rPr lang="fr-FR" smtClean="0"/>
-              <a:t>15/09/2025</a:t>
+              <a:t>17/10/2025</a:t>
             </a:fld>
             <a:endParaRPr lang="fr-FR"/>
           </a:p>
@@ -3737,7 +3737,7 @@
           <a:p>
             <a:fld id="{52212DD0-AC62-4744-9C7F-4A9162E5F150}" type="datetimeFigureOut">
               <a:rPr lang="fr-FR" smtClean="0"/>
-              <a:t>15/09/2025</a:t>
+              <a:t>17/10/2025</a:t>
             </a:fld>
             <a:endParaRPr lang="fr-FR"/>
           </a:p>
@@ -3935,7 +3935,7 @@
           <a:p>
             <a:fld id="{52212DD0-AC62-4744-9C7F-4A9162E5F150}" type="datetimeFigureOut">
               <a:rPr lang="fr-FR" smtClean="0"/>
-              <a:t>15/09/2025</a:t>
+              <a:t>17/10/2025</a:t>
             </a:fld>
             <a:endParaRPr lang="fr-FR"/>
           </a:p>
@@ -4210,7 +4210,7 @@
           <a:p>
             <a:fld id="{52212DD0-AC62-4744-9C7F-4A9162E5F150}" type="datetimeFigureOut">
               <a:rPr lang="fr-FR" smtClean="0"/>
-              <a:t>15/09/2025</a:t>
+              <a:t>17/10/2025</a:t>
             </a:fld>
             <a:endParaRPr lang="fr-FR"/>
           </a:p>
@@ -4475,7 +4475,7 @@
           <a:p>
             <a:fld id="{52212DD0-AC62-4744-9C7F-4A9162E5F150}" type="datetimeFigureOut">
               <a:rPr lang="fr-FR" smtClean="0"/>
-              <a:t>15/09/2025</a:t>
+              <a:t>17/10/2025</a:t>
             </a:fld>
             <a:endParaRPr lang="fr-FR"/>
           </a:p>
@@ -4887,7 +4887,7 @@
           <a:p>
             <a:fld id="{52212DD0-AC62-4744-9C7F-4A9162E5F150}" type="datetimeFigureOut">
               <a:rPr lang="fr-FR" smtClean="0"/>
-              <a:t>15/09/2025</a:t>
+              <a:t>17/10/2025</a:t>
             </a:fld>
             <a:endParaRPr lang="fr-FR"/>
           </a:p>
@@ -5028,7 +5028,7 @@
           <a:p>
             <a:fld id="{52212DD0-AC62-4744-9C7F-4A9162E5F150}" type="datetimeFigureOut">
               <a:rPr lang="fr-FR" smtClean="0"/>
-              <a:t>15/09/2025</a:t>
+              <a:t>17/10/2025</a:t>
             </a:fld>
             <a:endParaRPr lang="fr-FR"/>
           </a:p>
@@ -5141,7 +5141,7 @@
           <a:p>
             <a:fld id="{52212DD0-AC62-4744-9C7F-4A9162E5F150}" type="datetimeFigureOut">
               <a:rPr lang="fr-FR" smtClean="0"/>
-              <a:t>15/09/2025</a:t>
+              <a:t>17/10/2025</a:t>
             </a:fld>
             <a:endParaRPr lang="fr-FR"/>
           </a:p>
@@ -5452,7 +5452,7 @@
           <a:p>
             <a:fld id="{52212DD0-AC62-4744-9C7F-4A9162E5F150}" type="datetimeFigureOut">
               <a:rPr lang="fr-FR" smtClean="0"/>
-              <a:t>15/09/2025</a:t>
+              <a:t>17/10/2025</a:t>
             </a:fld>
             <a:endParaRPr lang="fr-FR"/>
           </a:p>
@@ -5740,7 +5740,7 @@
           <a:p>
             <a:fld id="{52212DD0-AC62-4744-9C7F-4A9162E5F150}" type="datetimeFigureOut">
               <a:rPr lang="fr-FR" smtClean="0"/>
-              <a:t>15/09/2025</a:t>
+              <a:t>17/10/2025</a:t>
             </a:fld>
             <a:endParaRPr lang="fr-FR"/>
           </a:p>
@@ -5981,7 +5981,7 @@
           <a:p>
             <a:fld id="{52212DD0-AC62-4744-9C7F-4A9162E5F150}" type="datetimeFigureOut">
               <a:rPr lang="fr-FR" smtClean="0"/>
-              <a:t>15/09/2025</a:t>
+              <a:t>17/10/2025</a:t>
             </a:fld>
             <a:endParaRPr lang="fr-FR"/>
           </a:p>

</xml_diff>